<commit_message>
minor bug fixes again
</commit_message>
<xml_diff>
--- a/05_ReleaseDocs/Initial Release_3_10_2017/Presentation.pptx
+++ b/05_ReleaseDocs/Initial Release_3_10_2017/Presentation.pptx
@@ -4293,38 +4293,40 @@
         </p:nvSpPr>
         <p:spPr/>
         <p:txBody>
-          <a:bodyPr/>
+          <a:bodyPr>
+            <a:normAutofit/>
+          </a:bodyPr>
           <a:lstStyle/>
           <a:p>
             <a:r>
-              <a:rPr lang="de-AT" dirty="0" err="1" smtClean="0"/>
+              <a:rPr lang="de-AT" sz="2800" dirty="0" err="1" smtClean="0"/>
               <a:t>Danijal</a:t>
             </a:r>
             <a:r>
-              <a:rPr lang="de-AT" dirty="0" smtClean="0"/>
+              <a:rPr lang="de-AT" sz="2800" dirty="0" smtClean="0"/>
               <a:t> </a:t>
             </a:r>
             <a:r>
-              <a:rPr lang="de-AT" dirty="0" err="1" smtClean="0"/>
+              <a:rPr lang="de-AT" sz="2800" dirty="0" err="1" smtClean="0"/>
               <a:t>orascanin</a:t>
             </a:r>
             <a:r>
-              <a:rPr lang="de-AT" dirty="0" smtClean="0"/>
+              <a:rPr lang="de-AT" sz="2800" dirty="0" smtClean="0"/>
               <a:t>, </a:t>
             </a:r>
             <a:r>
-              <a:rPr lang="de-AT" dirty="0" err="1" smtClean="0"/>
+              <a:rPr lang="de-AT" sz="2800" dirty="0" err="1" smtClean="0"/>
               <a:t>eva</a:t>
             </a:r>
             <a:r>
-              <a:rPr lang="de-AT" dirty="0" smtClean="0"/>
+              <a:rPr lang="de-AT" sz="2800" dirty="0" smtClean="0"/>
               <a:t> </a:t>
             </a:r>
             <a:r>
-              <a:rPr lang="de-AT" dirty="0" err="1" smtClean="0"/>
+              <a:rPr lang="de-AT" sz="2800" dirty="0" err="1" smtClean="0"/>
               <a:t>pürmayr</a:t>
             </a:r>
-            <a:endParaRPr lang="de-AT" dirty="0"/>
+            <a:endParaRPr lang="de-AT" sz="2800" dirty="0"/>
           </a:p>
         </p:txBody>
       </p:sp>
@@ -4374,7 +4376,7 @@
           <a:lstStyle/>
           <a:p>
             <a:r>
-              <a:rPr lang="de-AT" dirty="0" err="1" smtClean="0"/>
+              <a:rPr lang="de-AT" sz="5400" dirty="0" err="1" smtClean="0"/>
               <a:t>Overview</a:t>
             </a:r>
             <a:endParaRPr lang="de-AT" dirty="0"/>
@@ -4393,7 +4395,9 @@
         </p:nvSpPr>
         <p:spPr/>
         <p:txBody>
-          <a:bodyPr/>
+          <a:bodyPr>
+            <a:normAutofit/>
+          </a:bodyPr>
           <a:lstStyle/>
           <a:p>
             <a:pPr>
@@ -4401,46 +4405,46 @@
               <a:buChar char="•"/>
             </a:pPr>
             <a:r>
-              <a:rPr lang="de-AT" dirty="0"/>
+              <a:rPr lang="de-AT" sz="2400" dirty="0"/>
               <a:t> </a:t>
             </a:r>
             <a:r>
-              <a:rPr lang="de-AT" dirty="0" err="1" smtClean="0"/>
+              <a:rPr lang="de-AT" sz="2400" dirty="0" err="1" smtClean="0"/>
               <a:t>What</a:t>
             </a:r>
             <a:r>
-              <a:rPr lang="de-AT" dirty="0" smtClean="0"/>
+              <a:rPr lang="de-AT" sz="2400" dirty="0" smtClean="0"/>
               <a:t> </a:t>
             </a:r>
             <a:r>
-              <a:rPr lang="de-AT" dirty="0" err="1" smtClean="0"/>
+              <a:rPr lang="de-AT" sz="2400" dirty="0" err="1" smtClean="0"/>
               <a:t>is</a:t>
             </a:r>
             <a:r>
-              <a:rPr lang="de-AT" dirty="0" smtClean="0"/>
+              <a:rPr lang="de-AT" sz="2400" dirty="0" smtClean="0"/>
               <a:t> </a:t>
             </a:r>
             <a:r>
-              <a:rPr lang="de-AT" dirty="0" err="1" smtClean="0"/>
+              <a:rPr lang="de-AT" sz="2400" dirty="0" err="1" smtClean="0"/>
               <a:t>the</a:t>
             </a:r>
             <a:r>
-              <a:rPr lang="de-AT" dirty="0" smtClean="0"/>
+              <a:rPr lang="de-AT" sz="2400" dirty="0" smtClean="0"/>
               <a:t> </a:t>
             </a:r>
             <a:r>
-              <a:rPr lang="de-AT" dirty="0" err="1" smtClean="0"/>
+              <a:rPr lang="de-AT" sz="2400" dirty="0" err="1" smtClean="0"/>
               <a:t>project</a:t>
             </a:r>
             <a:r>
-              <a:rPr lang="de-AT" dirty="0" smtClean="0"/>
+              <a:rPr lang="de-AT" sz="2400" dirty="0" smtClean="0"/>
               <a:t> </a:t>
             </a:r>
             <a:r>
-              <a:rPr lang="de-AT" dirty="0" err="1" smtClean="0"/>
+              <a:rPr lang="de-AT" sz="2400" dirty="0" err="1" smtClean="0"/>
               <a:t>about</a:t>
             </a:r>
-            <a:endParaRPr lang="de-AT" dirty="0" smtClean="0"/>
+            <a:endParaRPr lang="de-AT" sz="2400" dirty="0" smtClean="0"/>
           </a:p>
           <a:p>
             <a:pPr>
@@ -4448,14 +4452,14 @@
               <a:buChar char="•"/>
             </a:pPr>
             <a:r>
-              <a:rPr lang="de-AT" dirty="0" smtClean="0"/>
+              <a:rPr lang="de-AT" sz="2400" dirty="0" smtClean="0"/>
               <a:t> Feature </a:t>
             </a:r>
             <a:r>
-              <a:rPr lang="de-AT" dirty="0" err="1" smtClean="0"/>
+              <a:rPr lang="de-AT" sz="2400" dirty="0" err="1" smtClean="0"/>
               <a:t>list</a:t>
             </a:r>
-            <a:endParaRPr lang="de-AT" dirty="0" smtClean="0"/>
+            <a:endParaRPr lang="de-AT" sz="2400" dirty="0" smtClean="0"/>
           </a:p>
           <a:p>
             <a:pPr>
@@ -4463,7 +4467,7 @@
               <a:buChar char="•"/>
             </a:pPr>
             <a:r>
-              <a:rPr lang="de-AT" dirty="0" smtClean="0"/>
+              <a:rPr lang="de-AT" sz="2400" dirty="0" smtClean="0"/>
               <a:t> Live Demo</a:t>
             </a:r>
           </a:p>
@@ -4473,58 +4477,58 @@
               <a:buChar char="•"/>
             </a:pPr>
             <a:r>
-              <a:rPr lang="de-AT" dirty="0" err="1" smtClean="0"/>
+              <a:rPr lang="de-AT" sz="2400" dirty="0" err="1" smtClean="0"/>
               <a:t>Planning</a:t>
             </a:r>
             <a:r>
-              <a:rPr lang="de-AT" dirty="0" smtClean="0"/>
+              <a:rPr lang="de-AT" sz="2400" dirty="0" smtClean="0"/>
               <a:t> </a:t>
             </a:r>
             <a:r>
-              <a:rPr lang="de-AT" dirty="0" err="1" smtClean="0"/>
+              <a:rPr lang="de-AT" sz="2400" dirty="0" err="1" smtClean="0"/>
               <a:t>for</a:t>
             </a:r>
             <a:r>
-              <a:rPr lang="de-AT" dirty="0" smtClean="0"/>
+              <a:rPr lang="de-AT" sz="2400" dirty="0" smtClean="0"/>
               <a:t> </a:t>
             </a:r>
             <a:r>
-              <a:rPr lang="de-AT" dirty="0" err="1" smtClean="0"/>
+              <a:rPr lang="de-AT" sz="2400" dirty="0" err="1" smtClean="0"/>
               <a:t>the</a:t>
             </a:r>
             <a:r>
-              <a:rPr lang="de-AT" dirty="0" smtClean="0"/>
+              <a:rPr lang="de-AT" sz="2400" dirty="0" smtClean="0"/>
               <a:t> </a:t>
             </a:r>
             <a:r>
-              <a:rPr lang="de-AT" dirty="0" err="1" smtClean="0"/>
+              <a:rPr lang="de-AT" sz="2400" dirty="0" err="1" smtClean="0"/>
               <a:t>rest</a:t>
             </a:r>
             <a:r>
-              <a:rPr lang="de-AT" dirty="0" smtClean="0"/>
+              <a:rPr lang="de-AT" sz="2400" dirty="0" smtClean="0"/>
               <a:t> </a:t>
             </a:r>
             <a:r>
-              <a:rPr lang="de-AT" dirty="0" err="1" smtClean="0"/>
+              <a:rPr lang="de-AT" sz="2400" dirty="0" err="1" smtClean="0"/>
               <a:t>of</a:t>
             </a:r>
             <a:r>
-              <a:rPr lang="de-AT" dirty="0" smtClean="0"/>
+              <a:rPr lang="de-AT" sz="2400" dirty="0" smtClean="0"/>
               <a:t> </a:t>
             </a:r>
             <a:r>
-              <a:rPr lang="de-AT" dirty="0" err="1" smtClean="0"/>
+              <a:rPr lang="de-AT" sz="2400" dirty="0" err="1" smtClean="0"/>
               <a:t>the</a:t>
             </a:r>
             <a:r>
-              <a:rPr lang="de-AT" dirty="0" smtClean="0"/>
+              <a:rPr lang="de-AT" sz="2400" dirty="0" smtClean="0"/>
               <a:t> </a:t>
             </a:r>
             <a:r>
-              <a:rPr lang="de-AT" dirty="0" err="1" smtClean="0"/>
+              <a:rPr lang="de-AT" sz="2400" dirty="0" err="1" smtClean="0"/>
               <a:t>year</a:t>
             </a:r>
-            <a:endParaRPr lang="de-AT" dirty="0"/>
+            <a:endParaRPr lang="de-AT" sz="2400" dirty="0"/>
           </a:p>
         </p:txBody>
       </p:sp>
@@ -4570,46 +4574,48 @@
         </p:nvSpPr>
         <p:spPr/>
         <p:txBody>
-          <a:bodyPr/>
+          <a:bodyPr>
+            <a:normAutofit/>
+          </a:bodyPr>
           <a:lstStyle/>
           <a:p>
             <a:r>
-              <a:rPr lang="de-AT" dirty="0" err="1" smtClean="0"/>
+              <a:rPr lang="de-AT" sz="5400" dirty="0" err="1" smtClean="0"/>
               <a:t>What</a:t>
             </a:r>
             <a:r>
-              <a:rPr lang="de-AT" dirty="0" smtClean="0"/>
+              <a:rPr lang="de-AT" sz="5400" dirty="0" smtClean="0"/>
               <a:t> </a:t>
             </a:r>
             <a:r>
-              <a:rPr lang="de-AT" dirty="0" err="1" smtClean="0"/>
+              <a:rPr lang="de-AT" sz="5400" dirty="0" err="1" smtClean="0"/>
               <a:t>is</a:t>
             </a:r>
             <a:r>
-              <a:rPr lang="de-AT" dirty="0" smtClean="0"/>
+              <a:rPr lang="de-AT" sz="5400" dirty="0" smtClean="0"/>
               <a:t> </a:t>
             </a:r>
             <a:r>
-              <a:rPr lang="de-AT" dirty="0" err="1" smtClean="0"/>
+              <a:rPr lang="de-AT" sz="5400" dirty="0" err="1" smtClean="0"/>
               <a:t>the</a:t>
             </a:r>
             <a:r>
-              <a:rPr lang="de-AT" dirty="0" smtClean="0"/>
+              <a:rPr lang="de-AT" sz="5400" dirty="0" smtClean="0"/>
               <a:t> </a:t>
             </a:r>
             <a:r>
-              <a:rPr lang="de-AT" dirty="0" err="1" smtClean="0"/>
+              <a:rPr lang="de-AT" sz="5400" dirty="0" err="1" smtClean="0"/>
               <a:t>project</a:t>
             </a:r>
             <a:r>
-              <a:rPr lang="de-AT" dirty="0" smtClean="0"/>
+              <a:rPr lang="de-AT" sz="5400" dirty="0" smtClean="0"/>
               <a:t> </a:t>
             </a:r>
             <a:r>
-              <a:rPr lang="de-AT" dirty="0" err="1" smtClean="0"/>
+              <a:rPr lang="de-AT" sz="5400" dirty="0" err="1" smtClean="0"/>
               <a:t>about</a:t>
             </a:r>
-            <a:endParaRPr lang="de-AT" dirty="0"/>
+            <a:endParaRPr lang="de-AT" sz="5400" dirty="0"/>
           </a:p>
         </p:txBody>
       </p:sp>
@@ -4633,56 +4639,52 @@
               <a:buChar char="•"/>
             </a:pPr>
             <a:r>
-              <a:rPr lang="de-AT" dirty="0"/>
+              <a:rPr lang="de-AT" sz="2400" dirty="0"/>
               <a:t> </a:t>
             </a:r>
             <a:r>
-              <a:rPr lang="de-AT" dirty="0" smtClean="0"/>
+              <a:rPr lang="de-AT" sz="2400" dirty="0" smtClean="0"/>
               <a:t>Online </a:t>
             </a:r>
             <a:r>
-              <a:rPr lang="de-AT" dirty="0" err="1" smtClean="0"/>
+              <a:rPr lang="de-AT" sz="2400" dirty="0" err="1" smtClean="0"/>
               <a:t>tutoring</a:t>
             </a:r>
             <a:r>
-              <a:rPr lang="de-AT" dirty="0" smtClean="0"/>
+              <a:rPr lang="de-AT" sz="2400" dirty="0" smtClean="0"/>
               <a:t> </a:t>
             </a:r>
             <a:r>
-              <a:rPr lang="de-AT" dirty="0" err="1" smtClean="0"/>
+              <a:rPr lang="de-AT" sz="2400" dirty="0" err="1" smtClean="0"/>
               <a:t>market</a:t>
             </a:r>
             <a:r>
-              <a:rPr lang="de-AT" dirty="0" smtClean="0"/>
+              <a:rPr lang="de-AT" sz="2400" dirty="0" smtClean="0"/>
               <a:t> in </a:t>
             </a:r>
             <a:r>
-              <a:rPr lang="de-AT" dirty="0" err="1" smtClean="0"/>
+              <a:rPr lang="de-AT" sz="2400" dirty="0" err="1" smtClean="0"/>
               <a:t>cooperation</a:t>
             </a:r>
             <a:r>
-              <a:rPr lang="de-AT" dirty="0" smtClean="0"/>
+              <a:rPr lang="de-AT" sz="2400" dirty="0" smtClean="0"/>
               <a:t> </a:t>
             </a:r>
             <a:r>
-              <a:rPr lang="de-AT" dirty="0" err="1" smtClean="0"/>
+              <a:rPr lang="de-AT" sz="2400" dirty="0" err="1" smtClean="0"/>
               <a:t>with</a:t>
             </a:r>
             <a:r>
-              <a:rPr lang="de-AT" dirty="0" smtClean="0"/>
+              <a:rPr lang="de-AT" sz="2400" dirty="0" smtClean="0"/>
               <a:t> </a:t>
             </a:r>
             <a:r>
-              <a:rPr lang="de-AT" dirty="0" err="1" smtClean="0"/>
+              <a:rPr lang="de-AT" sz="2400" dirty="0" err="1" smtClean="0"/>
               <a:t>Mrs</a:t>
             </a:r>
             <a:r>
-              <a:rPr lang="de-AT" dirty="0" smtClean="0"/>
-              <a:t> </a:t>
-            </a:r>
-            <a:r>
-              <a:rPr lang="de-AT" dirty="0" smtClean="0"/>
-              <a:t>Keck</a:t>
+              <a:rPr lang="de-AT" sz="2400" dirty="0" smtClean="0"/>
+              <a:t> Keck</a:t>
             </a:r>
           </a:p>
           <a:p>
@@ -4691,79 +4693,79 @@
               <a:buChar char="•"/>
             </a:pPr>
             <a:r>
-              <a:rPr lang="de-AT" dirty="0" smtClean="0"/>
+              <a:rPr lang="de-AT" sz="2400" dirty="0" smtClean="0"/>
               <a:t> </a:t>
             </a:r>
             <a:r>
-              <a:rPr lang="de-AT" dirty="0" err="1" smtClean="0"/>
+              <a:rPr lang="de-AT" sz="2400" dirty="0" err="1" smtClean="0"/>
               <a:t>Disadvantages</a:t>
             </a:r>
             <a:r>
-              <a:rPr lang="de-AT" dirty="0" smtClean="0"/>
+              <a:rPr lang="de-AT" sz="2400" dirty="0" smtClean="0"/>
               <a:t>: </a:t>
             </a:r>
             <a:r>
-              <a:rPr lang="de-AT" dirty="0" err="1" smtClean="0"/>
+              <a:rPr lang="de-AT" sz="2400" dirty="0" err="1" smtClean="0"/>
               <a:t>No</a:t>
             </a:r>
             <a:r>
-              <a:rPr lang="de-AT" dirty="0" smtClean="0"/>
+              <a:rPr lang="de-AT" sz="2400" dirty="0" smtClean="0"/>
               <a:t> </a:t>
             </a:r>
             <a:r>
-              <a:rPr lang="de-AT" dirty="0" err="1" smtClean="0"/>
+              <a:rPr lang="de-AT" sz="2400" dirty="0" err="1" smtClean="0"/>
               <a:t>images</a:t>
             </a:r>
             <a:r>
-              <a:rPr lang="de-AT" dirty="0" smtClean="0"/>
+              <a:rPr lang="de-AT" sz="2400" dirty="0" smtClean="0"/>
               <a:t>, </a:t>
             </a:r>
             <a:r>
-              <a:rPr lang="de-AT" dirty="0" err="1" smtClean="0"/>
+              <a:rPr lang="de-AT" sz="2400" dirty="0" err="1" smtClean="0"/>
               <a:t>system</a:t>
             </a:r>
             <a:r>
-              <a:rPr lang="de-AT" dirty="0" smtClean="0"/>
+              <a:rPr lang="de-AT" sz="2400" dirty="0" smtClean="0"/>
               <a:t> </a:t>
             </a:r>
             <a:r>
-              <a:rPr lang="de-AT" dirty="0" err="1" smtClean="0"/>
+              <a:rPr lang="de-AT" sz="2400" dirty="0" err="1" smtClean="0"/>
               <a:t>is</a:t>
             </a:r>
             <a:r>
-              <a:rPr lang="de-AT" dirty="0" smtClean="0"/>
+              <a:rPr lang="de-AT" sz="2400" dirty="0" smtClean="0"/>
               <a:t> </a:t>
             </a:r>
             <a:r>
-              <a:rPr lang="de-AT" dirty="0" err="1" smtClean="0"/>
+              <a:rPr lang="de-AT" sz="2400" dirty="0" err="1" smtClean="0"/>
               <a:t>outdated</a:t>
             </a:r>
             <a:r>
-              <a:rPr lang="de-AT" dirty="0" smtClean="0"/>
+              <a:rPr lang="de-AT" sz="2400" dirty="0" smtClean="0"/>
               <a:t>, </a:t>
             </a:r>
             <a:r>
-              <a:rPr lang="de-AT" dirty="0" err="1" smtClean="0"/>
+              <a:rPr lang="de-AT" sz="2400" dirty="0" err="1" smtClean="0"/>
               <a:t>no</a:t>
             </a:r>
             <a:r>
-              <a:rPr lang="de-AT" dirty="0" smtClean="0"/>
+              <a:rPr lang="de-AT" sz="2400" dirty="0" smtClean="0"/>
               <a:t> </a:t>
             </a:r>
             <a:r>
-              <a:rPr lang="de-AT" dirty="0" err="1" smtClean="0"/>
+              <a:rPr lang="de-AT" sz="2400" dirty="0" err="1" smtClean="0"/>
               <a:t>data</a:t>
             </a:r>
             <a:r>
-              <a:rPr lang="de-AT" dirty="0" smtClean="0"/>
+              <a:rPr lang="de-AT" sz="2400" dirty="0" smtClean="0"/>
               <a:t> </a:t>
             </a:r>
             <a:r>
-              <a:rPr lang="de-AT" dirty="0" err="1" smtClean="0"/>
+              <a:rPr lang="de-AT" sz="2400" dirty="0" err="1" smtClean="0"/>
               <a:t>assurance</a:t>
             </a:r>
             <a:r>
-              <a:rPr lang="de-AT" dirty="0" smtClean="0"/>
+              <a:rPr lang="de-AT" sz="2400" dirty="0" smtClean="0"/>
               <a:t>..</a:t>
             </a:r>
           </a:p>
@@ -4773,94 +4775,94 @@
               <a:buChar char="•"/>
             </a:pPr>
             <a:r>
-              <a:rPr lang="de-AT" dirty="0" smtClean="0"/>
+              <a:rPr lang="de-AT" sz="2400" dirty="0" smtClean="0"/>
               <a:t> Advantages: time </a:t>
             </a:r>
             <a:r>
-              <a:rPr lang="de-AT" dirty="0" err="1" smtClean="0"/>
+              <a:rPr lang="de-AT" sz="2400" dirty="0" err="1" smtClean="0"/>
               <a:t>saving</a:t>
             </a:r>
             <a:r>
-              <a:rPr lang="de-AT" dirty="0" smtClean="0"/>
+              <a:rPr lang="de-AT" sz="2400" dirty="0" smtClean="0"/>
               <a:t> </a:t>
             </a:r>
             <a:r>
-              <a:rPr lang="de-AT" dirty="0" err="1" smtClean="0"/>
+              <a:rPr lang="de-AT" sz="2400" dirty="0" err="1" smtClean="0"/>
               <a:t>for</a:t>
             </a:r>
             <a:r>
-              <a:rPr lang="de-AT" dirty="0" smtClean="0"/>
+              <a:rPr lang="de-AT" sz="2400" dirty="0" smtClean="0"/>
               <a:t> </a:t>
             </a:r>
             <a:r>
-              <a:rPr lang="de-AT" dirty="0" err="1" smtClean="0"/>
+              <a:rPr lang="de-AT" sz="2400" dirty="0" err="1" smtClean="0"/>
               <a:t>the</a:t>
             </a:r>
             <a:r>
-              <a:rPr lang="de-AT" dirty="0" smtClean="0"/>
+              <a:rPr lang="de-AT" sz="2400" dirty="0" smtClean="0"/>
               <a:t> </a:t>
             </a:r>
             <a:r>
-              <a:rPr lang="de-AT" dirty="0" err="1" smtClean="0"/>
+              <a:rPr lang="de-AT" sz="2400" dirty="0" err="1" smtClean="0"/>
               <a:t>adminsitrator</a:t>
             </a:r>
             <a:r>
-              <a:rPr lang="de-AT" dirty="0" smtClean="0"/>
+              <a:rPr lang="de-AT" sz="2400" dirty="0" smtClean="0"/>
               <a:t>, </a:t>
             </a:r>
             <a:r>
-              <a:rPr lang="de-AT" dirty="0" err="1" smtClean="0"/>
+              <a:rPr lang="de-AT" sz="2400" dirty="0" err="1" smtClean="0"/>
               <a:t>for</a:t>
             </a:r>
             <a:r>
-              <a:rPr lang="de-AT" dirty="0" smtClean="0"/>
+              <a:rPr lang="de-AT" sz="2400" dirty="0" smtClean="0"/>
               <a:t> </a:t>
             </a:r>
             <a:r>
-              <a:rPr lang="de-AT" dirty="0" err="1" smtClean="0"/>
+              <a:rPr lang="de-AT" sz="2400" dirty="0" err="1" smtClean="0"/>
               <a:t>the</a:t>
             </a:r>
             <a:r>
-              <a:rPr lang="de-AT" dirty="0" smtClean="0"/>
+              <a:rPr lang="de-AT" sz="2400" dirty="0" smtClean="0"/>
               <a:t> </a:t>
             </a:r>
             <a:r>
-              <a:rPr lang="de-AT" dirty="0" err="1" smtClean="0"/>
+              <a:rPr lang="de-AT" sz="2400" dirty="0" err="1" smtClean="0"/>
               <a:t>tutors</a:t>
             </a:r>
             <a:r>
-              <a:rPr lang="de-AT" dirty="0" smtClean="0"/>
+              <a:rPr lang="de-AT" sz="2400" dirty="0" smtClean="0"/>
               <a:t> </a:t>
             </a:r>
             <a:r>
-              <a:rPr lang="de-AT" dirty="0" err="1" smtClean="0"/>
+              <a:rPr lang="de-AT" sz="2400" dirty="0" err="1" smtClean="0"/>
               <a:t>and</a:t>
             </a:r>
             <a:r>
-              <a:rPr lang="de-AT" dirty="0" smtClean="0"/>
+              <a:rPr lang="de-AT" sz="2400" dirty="0" smtClean="0"/>
               <a:t> </a:t>
             </a:r>
             <a:r>
-              <a:rPr lang="de-AT" dirty="0" err="1" smtClean="0"/>
+              <a:rPr lang="de-AT" sz="2400" dirty="0" err="1" smtClean="0"/>
               <a:t>for</a:t>
             </a:r>
             <a:r>
-              <a:rPr lang="de-AT" dirty="0" smtClean="0"/>
+              <a:rPr lang="de-AT" sz="2400" dirty="0" smtClean="0"/>
               <a:t> </a:t>
             </a:r>
             <a:r>
-              <a:rPr lang="de-AT" dirty="0" err="1" smtClean="0"/>
+              <a:rPr lang="de-AT" sz="2400" dirty="0" err="1" smtClean="0"/>
               <a:t>the</a:t>
             </a:r>
             <a:r>
-              <a:rPr lang="de-AT" dirty="0" smtClean="0"/>
+              <a:rPr lang="de-AT" sz="2400" dirty="0" smtClean="0"/>
               <a:t> </a:t>
             </a:r>
             <a:r>
-              <a:rPr lang="de-AT" dirty="0" err="1" smtClean="0"/>
+              <a:rPr lang="de-AT" sz="2400" dirty="0" err="1" smtClean="0"/>
               <a:t>pupils</a:t>
             </a:r>
-            <a:endParaRPr lang="de-AT" dirty="0" smtClean="0"/>
+            <a:endParaRPr lang="de-AT" sz="2400" dirty="0" smtClean="0"/>
           </a:p>
           <a:p>
             <a:pPr>
@@ -4868,42 +4870,41 @@
               <a:buChar char="•"/>
             </a:pPr>
             <a:r>
-              <a:rPr lang="de-AT" dirty="0" smtClean="0"/>
+              <a:rPr lang="de-AT" sz="2400" dirty="0" smtClean="0"/>
               <a:t> Other </a:t>
             </a:r>
             <a:r>
-              <a:rPr lang="de-AT" dirty="0" err="1" smtClean="0"/>
+              <a:rPr lang="de-AT" sz="2400" dirty="0" err="1" smtClean="0"/>
               <a:t>software</a:t>
             </a:r>
             <a:r>
-              <a:rPr lang="de-AT" dirty="0" smtClean="0"/>
+              <a:rPr lang="de-AT" sz="2400" dirty="0" smtClean="0"/>
               <a:t> on </a:t>
             </a:r>
             <a:r>
-              <a:rPr lang="de-AT" dirty="0" err="1" smtClean="0"/>
+              <a:rPr lang="de-AT" sz="2400" dirty="0" err="1" smtClean="0"/>
               <a:t>the</a:t>
             </a:r>
             <a:r>
-              <a:rPr lang="de-AT" dirty="0" smtClean="0"/>
+              <a:rPr lang="de-AT" sz="2400" dirty="0" smtClean="0"/>
               <a:t> </a:t>
             </a:r>
             <a:r>
-              <a:rPr lang="de-AT" dirty="0" err="1" smtClean="0"/>
+              <a:rPr lang="de-AT" sz="2400" dirty="0" err="1" smtClean="0"/>
               <a:t>market</a:t>
             </a:r>
             <a:r>
-              <a:rPr lang="de-AT" dirty="0" smtClean="0"/>
+              <a:rPr lang="de-AT" sz="2400" dirty="0" smtClean="0"/>
               <a:t>: </a:t>
             </a:r>
             <a:r>
-              <a:rPr lang="de-AT" dirty="0" err="1" smtClean="0"/>
+              <a:rPr lang="de-AT" sz="2400" dirty="0" err="1" smtClean="0"/>
               <a:t>lernquadrat</a:t>
             </a:r>
             <a:r>
-              <a:rPr lang="de-AT" smtClean="0"/>
+              <a:rPr lang="de-AT" sz="2400" dirty="0" smtClean="0"/>
               <a:t>, talentify.me</a:t>
             </a:r>
-            <a:endParaRPr lang="de-AT" dirty="0" smtClean="0"/>
           </a:p>
           <a:p>
             <a:pPr>
@@ -4956,18 +4957,20 @@
         </p:nvSpPr>
         <p:spPr/>
         <p:txBody>
-          <a:bodyPr/>
+          <a:bodyPr>
+            <a:normAutofit/>
+          </a:bodyPr>
           <a:lstStyle/>
           <a:p>
             <a:r>
-              <a:rPr lang="de-AT" dirty="0" smtClean="0"/>
+              <a:rPr lang="de-AT" sz="5400" dirty="0" smtClean="0"/>
               <a:t>Feature </a:t>
             </a:r>
             <a:r>
-              <a:rPr lang="de-AT" dirty="0" err="1" smtClean="0"/>
+              <a:rPr lang="de-AT" sz="5400" dirty="0" err="1" smtClean="0"/>
               <a:t>list</a:t>
             </a:r>
-            <a:endParaRPr lang="de-AT" dirty="0"/>
+            <a:endParaRPr lang="de-AT" sz="5400" dirty="0"/>
           </a:p>
         </p:txBody>
       </p:sp>
@@ -5196,62 +5199,64 @@
         </p:nvSpPr>
         <p:spPr/>
         <p:txBody>
-          <a:bodyPr/>
+          <a:bodyPr>
+            <a:noAutofit/>
+          </a:bodyPr>
           <a:lstStyle/>
           <a:p>
             <a:r>
-              <a:rPr lang="de-AT" dirty="0" err="1" smtClean="0"/>
+              <a:rPr lang="de-AT" sz="5400" dirty="0" err="1" smtClean="0"/>
               <a:t>Planning</a:t>
             </a:r>
             <a:r>
-              <a:rPr lang="de-AT" dirty="0" smtClean="0"/>
+              <a:rPr lang="de-AT" sz="5400" dirty="0" smtClean="0"/>
               <a:t> </a:t>
             </a:r>
             <a:r>
-              <a:rPr lang="de-AT" dirty="0" err="1" smtClean="0"/>
+              <a:rPr lang="de-AT" sz="5400" dirty="0" err="1" smtClean="0"/>
               <a:t>for</a:t>
             </a:r>
             <a:r>
-              <a:rPr lang="de-AT" dirty="0" smtClean="0"/>
+              <a:rPr lang="de-AT" sz="5400" dirty="0" smtClean="0"/>
               <a:t> </a:t>
             </a:r>
             <a:r>
-              <a:rPr lang="de-AT" dirty="0" err="1" smtClean="0"/>
+              <a:rPr lang="de-AT" sz="5400" dirty="0" err="1" smtClean="0"/>
               <a:t>the</a:t>
             </a:r>
             <a:r>
-              <a:rPr lang="de-AT" dirty="0" smtClean="0"/>
+              <a:rPr lang="de-AT" sz="5400" dirty="0" smtClean="0"/>
               <a:t> </a:t>
             </a:r>
             <a:r>
-              <a:rPr lang="de-AT" dirty="0" err="1" smtClean="0"/>
+              <a:rPr lang="de-AT" sz="5400" dirty="0" err="1" smtClean="0"/>
               <a:t>rest</a:t>
             </a:r>
             <a:r>
-              <a:rPr lang="de-AT" dirty="0" smtClean="0"/>
+              <a:rPr lang="de-AT" sz="5400" dirty="0" smtClean="0"/>
               <a:t> </a:t>
             </a:r>
             <a:r>
-              <a:rPr lang="de-AT" dirty="0" err="1" smtClean="0"/>
+              <a:rPr lang="de-AT" sz="5400" dirty="0" err="1" smtClean="0"/>
               <a:t>of</a:t>
             </a:r>
             <a:r>
-              <a:rPr lang="de-AT" dirty="0" smtClean="0"/>
+              <a:rPr lang="de-AT" sz="5400" dirty="0" smtClean="0"/>
               <a:t> </a:t>
             </a:r>
             <a:r>
-              <a:rPr lang="de-AT" dirty="0" err="1" smtClean="0"/>
+              <a:rPr lang="de-AT" sz="5400" dirty="0" err="1" smtClean="0"/>
               <a:t>the</a:t>
             </a:r>
             <a:r>
-              <a:rPr lang="de-AT" dirty="0" smtClean="0"/>
+              <a:rPr lang="de-AT" sz="5400" dirty="0" smtClean="0"/>
               <a:t> </a:t>
             </a:r>
             <a:r>
-              <a:rPr lang="de-AT" dirty="0" err="1" smtClean="0"/>
+              <a:rPr lang="de-AT" sz="5400" dirty="0" err="1" smtClean="0"/>
               <a:t>year</a:t>
             </a:r>
-            <a:endParaRPr lang="de-AT" dirty="0"/>
+            <a:endParaRPr lang="de-AT" sz="5400" dirty="0"/>
           </a:p>
         </p:txBody>
       </p:sp>
@@ -5267,7 +5272,9 @@
         </p:nvSpPr>
         <p:spPr/>
         <p:txBody>
-          <a:bodyPr/>
+          <a:bodyPr>
+            <a:normAutofit/>
+          </a:bodyPr>
           <a:lstStyle/>
           <a:p>
             <a:pPr>
@@ -5275,19 +5282,19 @@
               <a:buChar char="•"/>
             </a:pPr>
             <a:r>
-              <a:rPr lang="de-AT" dirty="0"/>
+              <a:rPr lang="de-AT" sz="2400" dirty="0"/>
               <a:t> </a:t>
             </a:r>
             <a:r>
-              <a:rPr lang="de-AT" dirty="0" smtClean="0"/>
+              <a:rPr lang="de-AT" sz="2400" dirty="0" smtClean="0"/>
               <a:t>Minor </a:t>
             </a:r>
             <a:r>
-              <a:rPr lang="de-AT" dirty="0" err="1" smtClean="0"/>
+              <a:rPr lang="de-AT" sz="2400" dirty="0" err="1" smtClean="0"/>
               <a:t>bug</a:t>
             </a:r>
             <a:r>
-              <a:rPr lang="de-AT" dirty="0" smtClean="0"/>
+              <a:rPr lang="de-AT" sz="2400" dirty="0" smtClean="0"/>
               <a:t> fixes</a:t>
             </a:r>
           </a:p>
@@ -5297,22 +5304,22 @@
               <a:buChar char="•"/>
             </a:pPr>
             <a:r>
-              <a:rPr lang="de-AT" dirty="0" smtClean="0"/>
+              <a:rPr lang="de-AT" sz="2400" dirty="0" smtClean="0"/>
               <a:t> Images </a:t>
             </a:r>
             <a:r>
-              <a:rPr lang="de-AT" dirty="0" err="1" smtClean="0"/>
+              <a:rPr lang="de-AT" sz="2400" dirty="0" err="1" smtClean="0"/>
               <a:t>for</a:t>
             </a:r>
             <a:r>
-              <a:rPr lang="de-AT" dirty="0" smtClean="0"/>
+              <a:rPr lang="de-AT" sz="2400" dirty="0" smtClean="0"/>
               <a:t> </a:t>
             </a:r>
             <a:r>
-              <a:rPr lang="de-AT" dirty="0" err="1" smtClean="0"/>
+              <a:rPr lang="de-AT" sz="2400" dirty="0" err="1" smtClean="0"/>
               <a:t>tutors</a:t>
             </a:r>
-            <a:endParaRPr lang="de-AT" dirty="0" smtClean="0"/>
+            <a:endParaRPr lang="de-AT" sz="2400" dirty="0" smtClean="0"/>
           </a:p>
           <a:p>
             <a:pPr>
@@ -5320,22 +5327,22 @@
               <a:buChar char="•"/>
             </a:pPr>
             <a:r>
-              <a:rPr lang="de-AT" dirty="0"/>
+              <a:rPr lang="de-AT" sz="2400" dirty="0"/>
               <a:t> </a:t>
             </a:r>
             <a:r>
-              <a:rPr lang="de-AT" dirty="0" err="1" smtClean="0"/>
+              <a:rPr lang="de-AT" sz="2400" dirty="0" err="1" smtClean="0"/>
               <a:t>Sort</a:t>
             </a:r>
             <a:r>
-              <a:rPr lang="de-AT" dirty="0" smtClean="0"/>
+              <a:rPr lang="de-AT" sz="2400" dirty="0" smtClean="0"/>
               <a:t> </a:t>
             </a:r>
             <a:r>
-              <a:rPr lang="de-AT" dirty="0" err="1" smtClean="0"/>
+              <a:rPr lang="de-AT" sz="2400" dirty="0" err="1" smtClean="0"/>
               <a:t>tutors</a:t>
             </a:r>
-            <a:endParaRPr lang="de-AT" dirty="0" smtClean="0"/>
+            <a:endParaRPr lang="de-AT" sz="2400" dirty="0" smtClean="0"/>
           </a:p>
           <a:p>
             <a:pPr>
@@ -5343,87 +5350,87 @@
               <a:buChar char="•"/>
             </a:pPr>
             <a:r>
-              <a:rPr lang="de-AT" dirty="0"/>
+              <a:rPr lang="de-AT" sz="2400" dirty="0"/>
               <a:t> </a:t>
             </a:r>
             <a:r>
-              <a:rPr lang="de-AT" dirty="0" err="1" smtClean="0"/>
+              <a:rPr lang="de-AT" sz="2400" dirty="0" err="1" smtClean="0"/>
               <a:t>Extend</a:t>
             </a:r>
             <a:r>
-              <a:rPr lang="de-AT" dirty="0" smtClean="0"/>
+              <a:rPr lang="de-AT" sz="2400" dirty="0" smtClean="0"/>
               <a:t> </a:t>
             </a:r>
             <a:r>
-              <a:rPr lang="de-AT" dirty="0" err="1" smtClean="0"/>
+              <a:rPr lang="de-AT" sz="2400" dirty="0" err="1" smtClean="0"/>
               <a:t>administration</a:t>
             </a:r>
             <a:r>
-              <a:rPr lang="de-AT" dirty="0" smtClean="0"/>
+              <a:rPr lang="de-AT" sz="2400" dirty="0" smtClean="0"/>
               <a:t> </a:t>
             </a:r>
             <a:r>
-              <a:rPr lang="de-AT" dirty="0" err="1" smtClean="0"/>
+              <a:rPr lang="de-AT" sz="2400" dirty="0" err="1" smtClean="0"/>
               <a:t>area</a:t>
             </a:r>
             <a:r>
-              <a:rPr lang="de-AT" dirty="0" smtClean="0"/>
+              <a:rPr lang="de-AT" sz="2400" dirty="0" smtClean="0"/>
               <a:t> (</a:t>
             </a:r>
             <a:r>
-              <a:rPr lang="de-AT" dirty="0" err="1" smtClean="0"/>
+              <a:rPr lang="de-AT" sz="2400" dirty="0" err="1" smtClean="0"/>
               <a:t>statistic</a:t>
             </a:r>
             <a:r>
-              <a:rPr lang="de-AT" dirty="0" smtClean="0"/>
+              <a:rPr lang="de-AT" sz="2400" dirty="0" smtClean="0"/>
               <a:t>, </a:t>
             </a:r>
             <a:r>
-              <a:rPr lang="de-AT" dirty="0" err="1" smtClean="0"/>
+              <a:rPr lang="de-AT" sz="2400" dirty="0" err="1" smtClean="0"/>
               <a:t>edit</a:t>
             </a:r>
             <a:r>
-              <a:rPr lang="de-AT" dirty="0" smtClean="0"/>
+              <a:rPr lang="de-AT" sz="2400" dirty="0" smtClean="0"/>
               <a:t>/</a:t>
             </a:r>
             <a:r>
-              <a:rPr lang="de-AT" dirty="0" err="1" smtClean="0"/>
+              <a:rPr lang="de-AT" sz="2400" dirty="0" err="1" smtClean="0"/>
               <a:t>delete</a:t>
             </a:r>
             <a:r>
-              <a:rPr lang="de-AT" dirty="0" smtClean="0"/>
+              <a:rPr lang="de-AT" sz="2400" dirty="0" smtClean="0"/>
               <a:t> </a:t>
             </a:r>
             <a:r>
-              <a:rPr lang="de-AT" dirty="0" err="1" smtClean="0"/>
+              <a:rPr lang="de-AT" sz="2400" dirty="0" err="1" smtClean="0"/>
               <a:t>tutors</a:t>
             </a:r>
             <a:r>
-              <a:rPr lang="de-AT" dirty="0" smtClean="0"/>
+              <a:rPr lang="de-AT" sz="2400" dirty="0" smtClean="0"/>
               <a:t>, </a:t>
             </a:r>
             <a:r>
-              <a:rPr lang="de-AT" dirty="0" err="1" smtClean="0"/>
+              <a:rPr lang="de-AT" sz="2400" dirty="0" err="1" smtClean="0"/>
               <a:t>accecpt</a:t>
             </a:r>
             <a:r>
-              <a:rPr lang="de-AT" dirty="0" smtClean="0"/>
+              <a:rPr lang="de-AT" sz="2400" dirty="0" smtClean="0"/>
               <a:t>/</a:t>
             </a:r>
             <a:r>
-              <a:rPr lang="de-AT" dirty="0" err="1" smtClean="0"/>
+              <a:rPr lang="de-AT" sz="2400" dirty="0" err="1" smtClean="0"/>
               <a:t>reject</a:t>
             </a:r>
             <a:r>
-              <a:rPr lang="de-AT" dirty="0" smtClean="0"/>
+              <a:rPr lang="de-AT" sz="2400" dirty="0" smtClean="0"/>
               <a:t> </a:t>
             </a:r>
             <a:r>
-              <a:rPr lang="de-AT" dirty="0" err="1" smtClean="0"/>
+              <a:rPr lang="de-AT" sz="2400" dirty="0" err="1" smtClean="0"/>
               <a:t>reviews</a:t>
             </a:r>
             <a:r>
-              <a:rPr lang="de-AT" dirty="0" smtClean="0"/>
+              <a:rPr lang="de-AT" sz="2400" dirty="0" smtClean="0"/>
               <a:t>)</a:t>
             </a:r>
           </a:p>
@@ -5433,26 +5440,26 @@
               <a:buChar char="•"/>
             </a:pPr>
             <a:r>
-              <a:rPr lang="de-AT" dirty="0"/>
+              <a:rPr lang="de-AT" sz="2400" dirty="0"/>
               <a:t> </a:t>
             </a:r>
             <a:r>
-              <a:rPr lang="de-AT" dirty="0" smtClean="0"/>
+              <a:rPr lang="de-AT" sz="2400" dirty="0" smtClean="0"/>
               <a:t>Reviews </a:t>
             </a:r>
             <a:r>
-              <a:rPr lang="de-AT" dirty="0" err="1" smtClean="0"/>
+              <a:rPr lang="de-AT" sz="2400" dirty="0" err="1" smtClean="0"/>
               <a:t>for</a:t>
             </a:r>
             <a:r>
-              <a:rPr lang="de-AT" dirty="0" smtClean="0"/>
+              <a:rPr lang="de-AT" sz="2400" dirty="0" smtClean="0"/>
               <a:t> </a:t>
             </a:r>
             <a:r>
-              <a:rPr lang="de-AT" dirty="0" err="1" smtClean="0"/>
+              <a:rPr lang="de-AT" sz="2400" dirty="0" err="1" smtClean="0"/>
               <a:t>tutors</a:t>
             </a:r>
-            <a:endParaRPr lang="de-AT" dirty="0" smtClean="0"/>
+            <a:endParaRPr lang="de-AT" sz="2400" dirty="0" smtClean="0"/>
           </a:p>
           <a:p>
             <a:pPr>
@@ -5460,39 +5467,39 @@
               <a:buChar char="•"/>
             </a:pPr>
             <a:r>
-              <a:rPr lang="de-AT" dirty="0"/>
+              <a:rPr lang="de-AT" sz="2400" dirty="0"/>
               <a:t> </a:t>
             </a:r>
             <a:r>
-              <a:rPr lang="de-AT" dirty="0" err="1" smtClean="0"/>
+              <a:rPr lang="de-AT" sz="2400" dirty="0" err="1" smtClean="0"/>
               <a:t>Contact</a:t>
             </a:r>
             <a:r>
-              <a:rPr lang="de-AT" dirty="0" smtClean="0"/>
+              <a:rPr lang="de-AT" sz="2400" dirty="0" smtClean="0"/>
               <a:t> </a:t>
             </a:r>
             <a:r>
-              <a:rPr lang="de-AT" dirty="0" err="1" smtClean="0"/>
+              <a:rPr lang="de-AT" sz="2400" dirty="0" err="1" smtClean="0"/>
               <a:t>tutors</a:t>
             </a:r>
             <a:r>
-              <a:rPr lang="de-AT" dirty="0" smtClean="0"/>
+              <a:rPr lang="de-AT" sz="2400" dirty="0" smtClean="0"/>
               <a:t> (Default email </a:t>
             </a:r>
             <a:r>
-              <a:rPr lang="de-AT" dirty="0" err="1" smtClean="0"/>
+              <a:rPr lang="de-AT" sz="2400" dirty="0" err="1" smtClean="0"/>
               <a:t>or</a:t>
             </a:r>
             <a:r>
-              <a:rPr lang="de-AT" dirty="0" smtClean="0"/>
+              <a:rPr lang="de-AT" sz="2400" dirty="0" smtClean="0"/>
               <a:t> </a:t>
             </a:r>
             <a:r>
-              <a:rPr lang="de-AT" dirty="0" err="1" smtClean="0"/>
+              <a:rPr lang="de-AT" sz="2400" dirty="0" err="1" smtClean="0"/>
               <a:t>sms</a:t>
             </a:r>
             <a:r>
-              <a:rPr lang="de-AT" dirty="0" smtClean="0"/>
+              <a:rPr lang="de-AT" sz="2400" dirty="0" smtClean="0"/>
               <a:t>)</a:t>
             </a:r>
           </a:p>
@@ -5501,7 +5508,7 @@
               <a:buFont typeface="Arial" panose="020B0604020202020204" pitchFamily="34" charset="0"/>
               <a:buChar char="•"/>
             </a:pPr>
-            <a:endParaRPr lang="de-AT" dirty="0" smtClean="0"/>
+            <a:endParaRPr lang="de-AT" sz="2400" dirty="0" smtClean="0"/>
           </a:p>
         </p:txBody>
       </p:sp>
@@ -5552,6 +5559,44 @@
           <a:p>
             <a:r>
               <a:rPr lang="de-AT" dirty="0" err="1" smtClean="0"/>
+              <a:t>Any</a:t>
+            </a:r>
+            <a:r>
+              <a:rPr lang="de-AT" dirty="0" smtClean="0"/>
+              <a:t> </a:t>
+            </a:r>
+            <a:r>
+              <a:rPr lang="de-AT" dirty="0" err="1" smtClean="0"/>
+              <a:t>Questions</a:t>
+            </a:r>
+            <a:r>
+              <a:rPr lang="de-AT" dirty="0" smtClean="0"/>
+              <a:t>?</a:t>
+            </a:r>
+            <a:br>
+              <a:rPr lang="de-AT" dirty="0" smtClean="0"/>
+            </a:br>
+            <a:endParaRPr lang="de-AT" dirty="0"/>
+          </a:p>
+        </p:txBody>
+      </p:sp>
+      <p:sp>
+        <p:nvSpPr>
+          <p:cNvPr id="3" name="Untertitel 2"/>
+          <p:cNvSpPr>
+            <a:spLocks noGrp="1"/>
+          </p:cNvSpPr>
+          <p:nvPr>
+            <p:ph type="subTitle" idx="1"/>
+          </p:nvPr>
+        </p:nvSpPr>
+        <p:spPr/>
+        <p:txBody>
+          <a:bodyPr/>
+          <a:lstStyle/>
+          <a:p>
+            <a:r>
+              <a:rPr lang="de-AT" dirty="0" err="1" smtClean="0"/>
               <a:t>Thank</a:t>
             </a:r>
             <a:r>
@@ -5597,25 +5642,6 @@
               <a:t></a:t>
             </a:r>
             <a:endParaRPr lang="de-AT" dirty="0"/>
-          </a:p>
-        </p:txBody>
-      </p:sp>
-      <p:sp>
-        <p:nvSpPr>
-          <p:cNvPr id="3" name="Untertitel 2"/>
-          <p:cNvSpPr>
-            <a:spLocks noGrp="1"/>
-          </p:cNvSpPr>
-          <p:nvPr>
-            <p:ph type="subTitle" idx="1"/>
-          </p:nvPr>
-        </p:nvSpPr>
-        <p:spPr/>
-        <p:txBody>
-          <a:bodyPr/>
-          <a:lstStyle/>
-          <a:p>
-            <a:endParaRPr lang="de-AT"/>
           </a:p>
         </p:txBody>
       </p:sp>

</xml_diff>